<commit_message>
Update disaster and rescue slides
</commit_message>
<xml_diff>
--- a/hrf/disaster_and_rescue.pptx
+++ b/hrf/disaster_and_rescue.pptx
@@ -950,7 +950,7 @@
       </p:grpSpPr>
       <p:sp>
         <p:nvSpPr>
-          <p:cNvPr id="161" name="Google Shape;161;g112129c96ac_2_22:notes"/>
+          <p:cNvPr id="161" name="Google Shape;161;g11daae32d06_0_12:notes"/>
           <p:cNvSpPr/>
           <p:nvPr>
             <p:ph idx="2" type="sldImg"/>
@@ -995,7 +995,7 @@
       </p:sp>
       <p:sp>
         <p:nvSpPr>
-          <p:cNvPr id="162" name="Google Shape;162;g112129c96ac_2_22:notes"/>
+          <p:cNvPr id="162" name="Google Shape;162;g11daae32d06_0_12:notes"/>
           <p:cNvSpPr txBox="1"/>
           <p:nvPr>
             <p:ph idx="1" type="body"/>
@@ -14490,7 +14490,7 @@
         <p:spPr>
           <a:xfrm>
             <a:off x="311700" y="1017725"/>
-            <a:ext cx="4098000" cy="3078300"/>
+            <a:ext cx="4098000" cy="3255600"/>
           </a:xfrm>
           <a:prstGeom prst="rect">
             <a:avLst/>
@@ -14529,7 +14529,7 @@
                   <a:schemeClr val="dk1"/>
                 </a:solidFill>
               </a:rPr>
-              <a:t>Tornado (10638)</a:t>
+              <a:t>Tornado</a:t>
             </a:r>
             <a:r>
               <a:rPr lang="zh-CN" sz="1000">
@@ -14569,7 +14569,7 @@
                   <a:schemeClr val="dk1"/>
                 </a:solidFill>
               </a:rPr>
-              <a:t>Flood (10640)</a:t>
+              <a:t>Flood</a:t>
             </a:r>
             <a:r>
               <a:rPr lang="zh-CN" sz="1000">
@@ -14609,7 +14609,7 @@
                   <a:schemeClr val="dk1"/>
                 </a:solidFill>
               </a:rPr>
-              <a:t>Wildfire (10641)</a:t>
+              <a:t>Wildfire</a:t>
             </a:r>
             <a:r>
               <a:rPr lang="zh-CN" sz="1000">
@@ -14649,7 +14649,7 @@
                   <a:schemeClr val="dk1"/>
                 </a:solidFill>
               </a:rPr>
-              <a:t>Earthquake (10657)</a:t>
+              <a:t>Earthquake</a:t>
             </a:r>
             <a:r>
               <a:rPr lang="zh-CN" sz="1000">
@@ -14689,7 +14689,7 @@
                   <a:schemeClr val="dk1"/>
                 </a:solidFill>
               </a:rPr>
-              <a:t>Tsunami (10642)</a:t>
+              <a:t>Tsunami</a:t>
             </a:r>
             <a:r>
               <a:rPr lang="zh-CN" sz="1000">
@@ -14729,7 +14729,7 @@
                   <a:schemeClr val="dk1"/>
                 </a:solidFill>
               </a:rPr>
-              <a:t>Thunderstorm (10643)</a:t>
+              <a:t>Thunderstorm</a:t>
             </a:r>
             <a:r>
               <a:rPr lang="zh-CN" sz="1000">
@@ -14769,7 +14769,7 @@
                   <a:schemeClr val="dk1"/>
                 </a:solidFill>
               </a:rPr>
-              <a:t>Trap (10639)</a:t>
+              <a:t>Trap</a:t>
             </a:r>
             <a:r>
               <a:rPr lang="zh-CN" sz="1000">
@@ -14809,7 +14809,7 @@
                   <a:schemeClr val="dk1"/>
                 </a:solidFill>
               </a:rPr>
-              <a:t>Injury (10644)</a:t>
+              <a:t>Damage</a:t>
             </a:r>
             <a:r>
               <a:rPr lang="zh-CN" sz="1000">
@@ -14817,7 +14817,7 @@
                   <a:schemeClr val="dk1"/>
                 </a:solidFill>
               </a:rPr>
-              <a:t>: physiological wound caused by an external source</a:t>
+              <a:t>: changes introduced into a system that adversely affect its current or future performance</a:t>
             </a:r>
             <a:endParaRPr sz="1000">
               <a:solidFill>
@@ -14844,20 +14844,7 @@
               <a:buNone/>
             </a:pPr>
             <a:r>
-              <a:rPr b="1" lang="zh-CN" sz="1000">
-                <a:solidFill>
-                  <a:schemeClr val="dk1"/>
-                </a:solidFill>
-              </a:rPr>
-              <a:t>Death (10645)</a:t>
-            </a:r>
-            <a:r>
-              <a:rPr lang="zh-CN" sz="1000">
-                <a:solidFill>
-                  <a:schemeClr val="dk1"/>
-                </a:solidFill>
-              </a:rPr>
-              <a:t>: permanent cessation of vital functions</a:t>
+              <a:t/>
             </a:r>
             <a:endParaRPr sz="1000">
               <a:solidFill>
@@ -14883,8 +14870,8 @@
         </p:blipFill>
         <p:spPr>
           <a:xfrm>
-            <a:off x="4623275" y="865050"/>
-            <a:ext cx="4167125" cy="3271075"/>
+            <a:off x="4532650" y="836400"/>
+            <a:ext cx="3972087" cy="3820975"/>
           </a:xfrm>
           <a:prstGeom prst="rect">
             <a:avLst/>
@@ -14930,7 +14917,7 @@
         </p:nvSpPr>
         <p:spPr>
           <a:xfrm>
-            <a:off x="311700" y="445025"/>
+            <a:off x="361350" y="189825"/>
             <a:ext cx="8520600" cy="572700"/>
           </a:xfrm>
           <a:prstGeom prst="rect">
@@ -14976,8 +14963,8 @@
         </p:nvSpPr>
         <p:spPr>
           <a:xfrm>
-            <a:off x="311700" y="1017725"/>
-            <a:ext cx="7952100" cy="2951400"/>
+            <a:off x="361350" y="701725"/>
+            <a:ext cx="7952100" cy="2448900"/>
           </a:xfrm>
           <a:prstGeom prst="rect">
             <a:avLst/>
@@ -15016,7 +15003,7 @@
                   <a:schemeClr val="dk1"/>
                 </a:solidFill>
               </a:rPr>
-              <a:t>Announcement (10647): </a:t>
+              <a:t>Announcement</a:t>
             </a:r>
             <a:r>
               <a:rPr lang="zh-CN" sz="1050">
@@ -15024,7 +15011,7 @@
                   <a:schemeClr val="dk1"/>
                 </a:solidFill>
               </a:rPr>
-              <a:t>government announces the disaster to public</a:t>
+              <a:t>: government announces the disaster to public</a:t>
             </a:r>
             <a:endParaRPr sz="1050">
               <a:solidFill>
@@ -15056,7 +15043,7 @@
                   <a:schemeClr val="dk1"/>
                 </a:solidFill>
               </a:rPr>
-              <a:t>Command (10648): </a:t>
+              <a:t>Command</a:t>
             </a:r>
             <a:r>
               <a:rPr lang="zh-CN" sz="1050">
@@ -15064,7 +15051,7 @@
                   <a:schemeClr val="dk1"/>
                 </a:solidFill>
               </a:rPr>
-              <a:t>government commands rescuers to carry out rescue</a:t>
+              <a:t>: government commands rescuers to carry out rescue</a:t>
             </a:r>
             <a:endParaRPr sz="1050">
               <a:solidFill>
@@ -15096,7 +15083,7 @@
                   <a:schemeClr val="dk1"/>
                 </a:solidFill>
               </a:rPr>
-              <a:t>Communication (10649):</a:t>
+              <a:t>Communication</a:t>
             </a:r>
             <a:r>
               <a:rPr lang="zh-CN" sz="1050">
@@ -15104,7 +15091,7 @@
                   <a:schemeClr val="dk1"/>
                 </a:solidFill>
               </a:rPr>
-              <a:t> rescuers communicate with trapped victims</a:t>
+              <a:t>: rescuers communicate with trapped victims</a:t>
             </a:r>
             <a:endParaRPr sz="1050">
               <a:solidFill>
@@ -15136,7 +15123,7 @@
                   <a:schemeClr val="dk1"/>
                 </a:solidFill>
               </a:rPr>
-              <a:t>Emergency_evacuation (10650): </a:t>
+              <a:t>Emergency evacuation</a:t>
             </a:r>
             <a:r>
               <a:rPr lang="zh-CN" sz="1050">
@@ -15144,7 +15131,7 @@
                   <a:schemeClr val="dk1"/>
                 </a:solidFill>
               </a:rPr>
-              <a:t>rescuers evacuate trapped victims</a:t>
+              <a:t>: rescuers evacuate trapped victims</a:t>
             </a:r>
             <a:endParaRPr sz="1050">
               <a:solidFill>
@@ -15176,7 +15163,7 @@
                   <a:schemeClr val="dk1"/>
                 </a:solidFill>
               </a:rPr>
-              <a:t>Collaboration (10651): </a:t>
+              <a:t>Collaboration</a:t>
             </a:r>
             <a:r>
               <a:rPr lang="zh-CN" sz="1050">
@@ -15184,7 +15171,7 @@
                   <a:schemeClr val="dk1"/>
                 </a:solidFill>
               </a:rPr>
-              <a:t>different parties of rescuers collaborate</a:t>
+              <a:t>: different parties of rescuers collaborate</a:t>
             </a:r>
             <a:endParaRPr sz="1050">
               <a:solidFill>
@@ -15216,7 +15203,7 @@
                   <a:schemeClr val="dk1"/>
                 </a:solidFill>
               </a:rPr>
-              <a:t>Transport (10652): </a:t>
+              <a:t>Transport</a:t>
             </a:r>
             <a:r>
               <a:rPr lang="zh-CN" sz="1050">
@@ -15224,7 +15211,7 @@
                   <a:schemeClr val="dk1"/>
                 </a:solidFill>
               </a:rPr>
-              <a:t>rescuers transport victims to medical sites</a:t>
+              <a:t>: rescuers transport victims to medical sites</a:t>
             </a:r>
             <a:endParaRPr sz="1050">
               <a:solidFill>
@@ -15256,7 +15243,7 @@
                   <a:schemeClr val="dk1"/>
                 </a:solidFill>
               </a:rPr>
-              <a:t>Treatment (10653):</a:t>
+              <a:t>Treatment</a:t>
             </a:r>
             <a:r>
               <a:rPr lang="zh-CN" sz="1050">
@@ -15264,7 +15251,7 @@
                   <a:schemeClr val="dk1"/>
                 </a:solidFill>
               </a:rPr>
-              <a:t> medical treatment of the victims</a:t>
+              <a:t>: medical treatment of the victims</a:t>
             </a:r>
             <a:endParaRPr sz="1050">
               <a:solidFill>
@@ -15296,7 +15283,7 @@
                   <a:schemeClr val="dk1"/>
                 </a:solidFill>
               </a:rPr>
-              <a:t>Recover (10655): </a:t>
+              <a:t>Recover</a:t>
             </a:r>
             <a:r>
               <a:rPr lang="zh-CN" sz="1050">
@@ -15304,7 +15291,7 @@
                   <a:schemeClr val="dk1"/>
                 </a:solidFill>
               </a:rPr>
-              <a:t>victims recover from injuries</a:t>
+              <a:t>: victims recover from injuries</a:t>
             </a:r>
             <a:endParaRPr sz="1050">
               <a:solidFill>
@@ -15336,7 +15323,7 @@
                   <a:schemeClr val="dk1"/>
                 </a:solidFill>
               </a:rPr>
-              <a:t>Death (10656): </a:t>
+              <a:t>Death</a:t>
             </a:r>
             <a:r>
               <a:rPr lang="zh-CN" sz="1050">
@@ -15344,39 +15331,8 @@
                   <a:schemeClr val="dk1"/>
                 </a:solidFill>
               </a:rPr>
-              <a:t>permanent cessation of vital functions</a:t>
+              <a:t>: Patients die post treatment.</a:t>
             </a:r>
-            <a:endParaRPr sz="1050">
-              <a:solidFill>
-                <a:schemeClr val="dk1"/>
-              </a:solidFill>
-            </a:endParaRPr>
-          </a:p>
-          <a:p>
-            <a:pPr indent="0" lvl="0" marL="0" marR="0" rtl="0" algn="l">
-              <a:lnSpc>
-                <a:spcPct val="115000"/>
-              </a:lnSpc>
-              <a:spcBef>
-                <a:spcPts val="600"/>
-              </a:spcBef>
-              <a:spcAft>
-                <a:spcPts val="0"/>
-              </a:spcAft>
-              <a:buClr>
-                <a:srgbClr val="000000"/>
-              </a:buClr>
-              <a:buSzPts val="1050"/>
-              <a:buFont typeface="Arial"/>
-              <a:buNone/>
-            </a:pPr>
-            <a:br>
-              <a:rPr lang="zh-CN" sz="1050">
-                <a:solidFill>
-                  <a:schemeClr val="dk1"/>
-                </a:solidFill>
-              </a:rPr>
-            </a:br>
             <a:endParaRPr b="0" i="0" sz="1400" u="none" cap="none" strike="noStrike">
               <a:solidFill>
                 <a:srgbClr val="000000"/>
@@ -15399,13 +15355,13 @@
           <a:blip r:embed="rId3">
             <a:alphaModFix/>
           </a:blip>
-          <a:srcRect b="12168" l="0" r="0" t="10671"/>
+          <a:srcRect b="15540" l="0" r="0" t="0"/>
           <a:stretch/>
         </p:blipFill>
         <p:spPr>
           <a:xfrm>
-            <a:off x="1386500" y="3484025"/>
-            <a:ext cx="6979799" cy="1522725"/>
+            <a:off x="686825" y="3413425"/>
+            <a:ext cx="8195124" cy="1608500"/>
           </a:xfrm>
           <a:prstGeom prst="rect">
             <a:avLst/>
@@ -15707,7 +15663,7 @@
         <p:spPr>
           <a:xfrm>
             <a:off x="311700" y="1017725"/>
-            <a:ext cx="6739800" cy="1660500"/>
+            <a:ext cx="6739800" cy="1923300"/>
           </a:xfrm>
           <a:prstGeom prst="rect">
             <a:avLst/>
@@ -15746,7 +15702,7 @@
                   <a:schemeClr val="dk1"/>
                 </a:solidFill>
               </a:rPr>
-              <a:t>Collapse (10602): </a:t>
+              <a:t>Collapse</a:t>
             </a:r>
             <a:r>
               <a:rPr lang="zh-CN" sz="1050">
@@ -15754,7 +15710,7 @@
                   <a:schemeClr val="dk1"/>
                 </a:solidFill>
               </a:rPr>
-              <a:t>Collapse of a building etc., in a disaster</a:t>
+              <a:t>: Collapse of a building etc., in a disaster</a:t>
             </a:r>
             <a:endParaRPr sz="1050">
               <a:solidFill>
@@ -15786,7 +15742,7 @@
                   <a:schemeClr val="dk1"/>
                 </a:solidFill>
               </a:rPr>
-              <a:t>Conflagration (10604): </a:t>
+              <a:t>Conflagration</a:t>
             </a:r>
             <a:r>
               <a:rPr lang="zh-CN" sz="1050">
@@ -15794,7 +15750,7 @@
                   <a:schemeClr val="dk1"/>
                 </a:solidFill>
               </a:rPr>
-              <a:t>large and destructive fire that threatens human life, animal life, health, and/or property</a:t>
+              <a:t>: An area or building is set on fire.</a:t>
             </a:r>
             <a:endParaRPr sz="1050">
               <a:solidFill>
@@ -15826,7 +15782,7 @@
                   <a:schemeClr val="dk1"/>
                 </a:solidFill>
               </a:rPr>
-              <a:t>Trap (10605): </a:t>
+              <a:t>Trap</a:t>
             </a:r>
             <a:r>
               <a:rPr lang="zh-CN" sz="1050">
@@ -15834,7 +15790,7 @@
                   <a:schemeClr val="dk1"/>
                 </a:solidFill>
               </a:rPr>
-              <a:t>victims are trapped in the disaster site</a:t>
+              <a:t>: victims are trapped in the disaster site</a:t>
             </a:r>
             <a:endParaRPr sz="1050">
               <a:solidFill>
@@ -15866,7 +15822,7 @@
                   <a:schemeClr val="dk1"/>
                 </a:solidFill>
               </a:rPr>
-              <a:t>Damage (10603): </a:t>
+              <a:t>Damage</a:t>
             </a:r>
             <a:r>
               <a:rPr lang="zh-CN" sz="1050">
@@ -15874,7 +15830,7 @@
                   <a:schemeClr val="dk1"/>
                 </a:solidFill>
               </a:rPr>
-              <a:t>changes introduced into a system that adversely affect its current or future performance</a:t>
+              <a:t>: Damage caused to buildings at the disaster site.</a:t>
             </a:r>
             <a:endParaRPr sz="1050">
               <a:solidFill>
@@ -15906,7 +15862,7 @@
                   <a:schemeClr val="dk1"/>
                 </a:solidFill>
               </a:rPr>
-              <a:t>Injury (10606): </a:t>
+              <a:t>Injury</a:t>
             </a:r>
             <a:r>
               <a:rPr lang="zh-CN" sz="1050">
@@ -15914,7 +15870,7 @@
                   <a:schemeClr val="dk1"/>
                 </a:solidFill>
               </a:rPr>
-              <a:t>physiological wound caused by an external source</a:t>
+              <a:t>: Victims are injured by the disaster.</a:t>
             </a:r>
             <a:endParaRPr sz="1050">
               <a:solidFill>
@@ -15946,7 +15902,7 @@
                   <a:schemeClr val="dk1"/>
                 </a:solidFill>
               </a:rPr>
-              <a:t>Death (10607):</a:t>
+              <a:t>Death</a:t>
             </a:r>
             <a:r>
               <a:rPr lang="zh-CN" sz="1050">
@@ -15954,7 +15910,34 @@
                   <a:schemeClr val="dk1"/>
                 </a:solidFill>
               </a:rPr>
-              <a:t> permanent cessation of vital functions</a:t>
+              <a:t>: Victims die from the disaster.</a:t>
+            </a:r>
+            <a:endParaRPr sz="1050">
+              <a:solidFill>
+                <a:schemeClr val="dk1"/>
+              </a:solidFill>
+            </a:endParaRPr>
+          </a:p>
+          <a:p>
+            <a:pPr indent="0" lvl="0" marL="0" marR="0" rtl="0" algn="l">
+              <a:lnSpc>
+                <a:spcPct val="115000"/>
+              </a:lnSpc>
+              <a:spcBef>
+                <a:spcPts val="600"/>
+              </a:spcBef>
+              <a:spcAft>
+                <a:spcPts val="0"/>
+              </a:spcAft>
+              <a:buClr>
+                <a:schemeClr val="dk1"/>
+              </a:buClr>
+              <a:buSzPts val="1100"/>
+              <a:buFont typeface="Arial"/>
+              <a:buNone/>
+            </a:pPr>
+            <a:r>
+              <a:t/>
             </a:r>
             <a:endParaRPr sz="1050">
               <a:solidFill>
@@ -15970,17 +15953,18 @@
           <p:cNvPicPr preferRelativeResize="0"/>
           <p:nvPr/>
         </p:nvPicPr>
-        <p:blipFill rotWithShape="1">
+        <p:blipFill>
           <a:blip r:embed="rId3">
             <a:alphaModFix/>
           </a:blip>
-          <a:srcRect b="0" l="18227" r="0" t="0"/>
-          <a:stretch/>
+          <a:stretch>
+            <a:fillRect/>
+          </a:stretch>
         </p:blipFill>
         <p:spPr>
           <a:xfrm>
-            <a:off x="4132338" y="2629275"/>
-            <a:ext cx="4502425" cy="2110850"/>
+            <a:off x="3989775" y="2730575"/>
+            <a:ext cx="4759181" cy="2160475"/>
           </a:xfrm>
           <a:prstGeom prst="rect">
             <a:avLst/>
@@ -16026,7 +16010,7 @@
         </p:nvSpPr>
         <p:spPr>
           <a:xfrm>
-            <a:off x="311700" y="445025"/>
+            <a:off x="361350" y="189825"/>
             <a:ext cx="8520600" cy="572700"/>
           </a:xfrm>
           <a:prstGeom prst="rect">
@@ -16072,8 +16056,8 @@
         </p:nvSpPr>
         <p:spPr>
           <a:xfrm>
-            <a:off x="311700" y="1017725"/>
-            <a:ext cx="7952100" cy="2951400"/>
+            <a:off x="361350" y="701725"/>
+            <a:ext cx="7952100" cy="2448900"/>
           </a:xfrm>
           <a:prstGeom prst="rect">
             <a:avLst/>
@@ -16112,7 +16096,7 @@
                   <a:schemeClr val="dk1"/>
                 </a:solidFill>
               </a:rPr>
-              <a:t>Announcement (10608): </a:t>
+              <a:t>Announcement</a:t>
             </a:r>
             <a:r>
               <a:rPr lang="zh-CN" sz="1050">
@@ -16120,7 +16104,7 @@
                   <a:schemeClr val="dk1"/>
                 </a:solidFill>
               </a:rPr>
-              <a:t>government announces the disaster to public</a:t>
+              <a:t>: government announces the disaster to public</a:t>
             </a:r>
             <a:endParaRPr sz="1050">
               <a:solidFill>
@@ -16152,7 +16136,7 @@
                   <a:schemeClr val="dk1"/>
                 </a:solidFill>
               </a:rPr>
-              <a:t>Command (10609): </a:t>
+              <a:t>Command</a:t>
             </a:r>
             <a:r>
               <a:rPr lang="zh-CN" sz="1050">
@@ -16160,7 +16144,7 @@
                   <a:schemeClr val="dk1"/>
                 </a:solidFill>
               </a:rPr>
-              <a:t>government commands rescuers to carry out rescue</a:t>
+              <a:t>: government commands rescuers to carry out rescue</a:t>
             </a:r>
             <a:endParaRPr sz="1050">
               <a:solidFill>
@@ -16192,7 +16176,7 @@
                   <a:schemeClr val="dk1"/>
                 </a:solidFill>
               </a:rPr>
-              <a:t>Communication (10610):</a:t>
+              <a:t>Communication</a:t>
             </a:r>
             <a:r>
               <a:rPr lang="zh-CN" sz="1050">
@@ -16200,7 +16184,7 @@
                   <a:schemeClr val="dk1"/>
                 </a:solidFill>
               </a:rPr>
-              <a:t> rescuers communicate with trapped victims</a:t>
+              <a:t>: rescuers communicate with trapped victims</a:t>
             </a:r>
             <a:endParaRPr sz="1050">
               <a:solidFill>
@@ -16232,7 +16216,7 @@
                   <a:schemeClr val="dk1"/>
                 </a:solidFill>
               </a:rPr>
-              <a:t>Emergency_evacuation (10611): </a:t>
+              <a:t>Emergency evacuation</a:t>
             </a:r>
             <a:r>
               <a:rPr lang="zh-CN" sz="1050">
@@ -16240,7 +16224,7 @@
                   <a:schemeClr val="dk1"/>
                 </a:solidFill>
               </a:rPr>
-              <a:t>rescuers evacuate trapped victims</a:t>
+              <a:t>: rescuers evacuate trapped victims</a:t>
             </a:r>
             <a:endParaRPr sz="1050">
               <a:solidFill>
@@ -16272,7 +16256,7 @@
                   <a:schemeClr val="dk1"/>
                 </a:solidFill>
               </a:rPr>
-              <a:t>Collaboration (10612): </a:t>
+              <a:t>Collaboration</a:t>
             </a:r>
             <a:r>
               <a:rPr lang="zh-CN" sz="1050">
@@ -16280,7 +16264,7 @@
                   <a:schemeClr val="dk1"/>
                 </a:solidFill>
               </a:rPr>
-              <a:t>different parties of rescuers collaborate</a:t>
+              <a:t>: different parties of rescuers collaborate</a:t>
             </a:r>
             <a:endParaRPr sz="1050">
               <a:solidFill>
@@ -16312,7 +16296,7 @@
                   <a:schemeClr val="dk1"/>
                 </a:solidFill>
               </a:rPr>
-              <a:t>Transport (10613): </a:t>
+              <a:t>Transport</a:t>
             </a:r>
             <a:r>
               <a:rPr lang="zh-CN" sz="1050">
@@ -16320,7 +16304,7 @@
                   <a:schemeClr val="dk1"/>
                 </a:solidFill>
               </a:rPr>
-              <a:t>rescuers transport victims to medical sites</a:t>
+              <a:t>: rescuers transport victims to medical sites</a:t>
             </a:r>
             <a:endParaRPr sz="1050">
               <a:solidFill>
@@ -16352,7 +16336,7 @@
                   <a:schemeClr val="dk1"/>
                 </a:solidFill>
               </a:rPr>
-              <a:t>Treatment (10614):</a:t>
+              <a:t>Treatment</a:t>
             </a:r>
             <a:r>
               <a:rPr lang="zh-CN" sz="1050">
@@ -16360,7 +16344,7 @@
                   <a:schemeClr val="dk1"/>
                 </a:solidFill>
               </a:rPr>
-              <a:t> medical treatment of the victims</a:t>
+              <a:t>: medical treatment of the victims</a:t>
             </a:r>
             <a:endParaRPr sz="1050">
               <a:solidFill>
@@ -16392,7 +16376,7 @@
                   <a:schemeClr val="dk1"/>
                 </a:solidFill>
               </a:rPr>
-              <a:t>Recover (10633): </a:t>
+              <a:t>Recover</a:t>
             </a:r>
             <a:r>
               <a:rPr lang="zh-CN" sz="1050">
@@ -16400,7 +16384,7 @@
                   <a:schemeClr val="dk1"/>
                 </a:solidFill>
               </a:rPr>
-              <a:t>victims recover from injuries</a:t>
+              <a:t>: victims recover from injuries</a:t>
             </a:r>
             <a:endParaRPr sz="1050">
               <a:solidFill>
@@ -16432,7 +16416,7 @@
                   <a:schemeClr val="dk1"/>
                 </a:solidFill>
               </a:rPr>
-              <a:t>Death (10634): </a:t>
+              <a:t>Death</a:t>
             </a:r>
             <a:r>
               <a:rPr lang="zh-CN" sz="1050">
@@ -16440,39 +16424,8 @@
                   <a:schemeClr val="dk1"/>
                 </a:solidFill>
               </a:rPr>
-              <a:t>permanent cessation of vital functions</a:t>
+              <a:t>: Patients die post treatment.</a:t>
             </a:r>
-            <a:endParaRPr sz="1050">
-              <a:solidFill>
-                <a:schemeClr val="dk1"/>
-              </a:solidFill>
-            </a:endParaRPr>
-          </a:p>
-          <a:p>
-            <a:pPr indent="0" lvl="0" marL="0" marR="0" rtl="0" algn="l">
-              <a:lnSpc>
-                <a:spcPct val="115000"/>
-              </a:lnSpc>
-              <a:spcBef>
-                <a:spcPts val="600"/>
-              </a:spcBef>
-              <a:spcAft>
-                <a:spcPts val="0"/>
-              </a:spcAft>
-              <a:buClr>
-                <a:srgbClr val="000000"/>
-              </a:buClr>
-              <a:buSzPts val="1050"/>
-              <a:buFont typeface="Arial"/>
-              <a:buNone/>
-            </a:pPr>
-            <a:br>
-              <a:rPr lang="zh-CN" sz="1050">
-                <a:solidFill>
-                  <a:schemeClr val="dk1"/>
-                </a:solidFill>
-              </a:rPr>
-            </a:br>
             <a:endParaRPr b="0" i="0" sz="1400" u="none" cap="none" strike="noStrike">
               <a:solidFill>
                 <a:srgbClr val="000000"/>
@@ -16495,13 +16448,13 @@
           <a:blip r:embed="rId3">
             <a:alphaModFix/>
           </a:blip>
-          <a:srcRect b="12168" l="0" r="0" t="10671"/>
+          <a:srcRect b="15540" l="0" r="0" t="0"/>
           <a:stretch/>
         </p:blipFill>
         <p:spPr>
           <a:xfrm>
-            <a:off x="1386500" y="3484025"/>
-            <a:ext cx="6979799" cy="1522725"/>
+            <a:off x="686825" y="3413425"/>
+            <a:ext cx="8195124" cy="1608500"/>
           </a:xfrm>
           <a:prstGeom prst="rect">
             <a:avLst/>
@@ -16585,43 +16538,16 @@
           </a:p>
         </p:txBody>
       </p:sp>
-      <p:pic>
-        <p:nvPicPr>
-          <p:cNvPr id="132" name="Google Shape;132;p30"/>
-          <p:cNvPicPr preferRelativeResize="0"/>
-          <p:nvPr/>
-        </p:nvPicPr>
-        <p:blipFill rotWithShape="1">
-          <a:blip r:embed="rId3">
-            <a:alphaModFix/>
-          </a:blip>
-          <a:srcRect b="0" l="0" r="0" t="0"/>
-          <a:stretch/>
-        </p:blipFill>
-        <p:spPr>
-          <a:xfrm>
-            <a:off x="3400425" y="1685925"/>
-            <a:ext cx="5743575" cy="3457575"/>
-          </a:xfrm>
-          <a:prstGeom prst="rect">
-            <a:avLst/>
-          </a:prstGeom>
-          <a:noFill/>
-          <a:ln>
-            <a:noFill/>
-          </a:ln>
-        </p:spPr>
-      </p:pic>
       <p:sp>
         <p:nvSpPr>
-          <p:cNvPr id="133" name="Google Shape;133;p30"/>
+          <p:cNvPr id="132" name="Google Shape;132;p30"/>
           <p:cNvSpPr txBox="1"/>
           <p:nvPr/>
         </p:nvSpPr>
         <p:spPr>
           <a:xfrm>
             <a:off x="247450" y="1221250"/>
-            <a:ext cx="4865400" cy="3750000"/>
+            <a:ext cx="3286200" cy="3378300"/>
           </a:xfrm>
           <a:prstGeom prst="rect">
             <a:avLst/>
@@ -16642,20 +16568,28 @@
                 <a:spcPct val="115000"/>
               </a:lnSpc>
               <a:spcBef>
-                <a:spcPts val="0"/>
-              </a:spcBef>
-              <a:spcAft>
-                <a:spcPts val="0"/>
-              </a:spcAft>
-              <a:buClr>
-                <a:schemeClr val="dk1"/>
-              </a:buClr>
-              <a:buSzPts val="1100"/>
+                <a:spcPts val="600"/>
+              </a:spcBef>
+              <a:spcAft>
+                <a:spcPts val="0"/>
+              </a:spcAft>
+              <a:buClr>
+                <a:srgbClr val="000000"/>
+              </a:buClr>
+              <a:buSzPts val="1050"/>
               <a:buFont typeface="Arial"/>
               <a:buNone/>
             </a:pPr>
             <a:r>
               <a:rPr b="1" i="0" lang="zh-CN" sz="1050" u="none" cap="none" strike="noStrike">
+                <a:solidFill>
+                  <a:schemeClr val="dk1"/>
+                </a:solidFill>
+              </a:rPr>
+              <a:t>Identifycategorize</a:t>
+            </a:r>
+            <a:r>
+              <a:rPr b="0" i="0" lang="zh-CN" sz="1050" u="none" cap="none" strike="noStrike">
                 <a:solidFill>
                   <a:schemeClr val="dk1"/>
                 </a:solidFill>
@@ -16664,35 +16598,7 @@
                 <a:cs typeface="Arial"/>
                 <a:sym typeface="Arial"/>
               </a:rPr>
-              <a:t>IdentifyCategorize </a:t>
-            </a:r>
-            <a:r>
-              <a:rPr b="1" lang="zh-CN" sz="1050">
-                <a:solidFill>
-                  <a:schemeClr val="dk1"/>
-                </a:solidFill>
-              </a:rPr>
-              <a:t>(10616)</a:t>
-            </a:r>
-            <a:r>
-              <a:rPr b="0" i="0" lang="zh-CN" sz="1050" u="none" cap="none" strike="noStrike">
-                <a:solidFill>
-                  <a:schemeClr val="dk1"/>
-                </a:solidFill>
-                <a:latin typeface="Arial"/>
-                <a:ea typeface="Arial"/>
-                <a:cs typeface="Arial"/>
-                <a:sym typeface="Arial"/>
-              </a:rPr>
-              <a:t>: </a:t>
-            </a:r>
-            <a:r>
-              <a:rPr lang="zh-CN" sz="1050">
-                <a:solidFill>
-                  <a:schemeClr val="dk1"/>
-                </a:solidFill>
-              </a:rPr>
-              <a:t>Investigation of a manmade disaster includes identifying its initiators</a:t>
+              <a:t>: Investigation of a manmade disaster includes identifying its initiators.</a:t>
             </a:r>
             <a:endParaRPr b="0" i="0" sz="1050" u="none" cap="none" strike="noStrike">
               <a:solidFill>
@@ -16723,24 +16629,12 @@
               <a:buNone/>
             </a:pPr>
             <a:r>
-              <a:rPr b="1" i="0" lang="zh-CN" sz="1050" u="none" cap="none" strike="noStrike">
+              <a:rPr b="1" lang="zh-CN" sz="1050">
                 <a:solidFill>
                   <a:schemeClr val="dk1"/>
                 </a:solidFill>
-                <a:latin typeface="Arial"/>
-                <a:ea typeface="Arial"/>
-                <a:cs typeface="Arial"/>
-                <a:sym typeface="Arial"/>
               </a:rPr>
-              <a:t>Contact </a:t>
-            </a:r>
-            <a:r>
-              <a:rPr b="1" lang="zh-CN" sz="1050">
-                <a:solidFill>
-                  <a:schemeClr val="dk1"/>
-                </a:solidFill>
-              </a:rPr>
-              <a:t>(10617)</a:t>
+              <a:t>Contact</a:t>
             </a:r>
             <a:r>
               <a:rPr b="0" i="0" lang="zh-CN" sz="1050" u="none" cap="none" strike="noStrike">
@@ -16783,7 +16677,15 @@
               <a:buNone/>
             </a:pPr>
             <a:r>
-              <a:rPr b="1" i="0" lang="zh-CN" sz="1050" u="none" cap="none" strike="noStrike">
+              <a:rPr b="1" lang="zh-CN" sz="1050">
+                <a:solidFill>
+                  <a:schemeClr val="dk1"/>
+                </a:solidFill>
+              </a:rPr>
+              <a:t>Arrest</a:t>
+            </a:r>
+            <a:r>
+              <a:rPr b="0" i="0" lang="zh-CN" sz="1050" u="none" cap="none" strike="noStrike">
                 <a:solidFill>
                   <a:schemeClr val="dk1"/>
                 </a:solidFill>
@@ -16792,35 +16694,7 @@
                 <a:cs typeface="Arial"/>
                 <a:sym typeface="Arial"/>
               </a:rPr>
-              <a:t>Arrest </a:t>
-            </a:r>
-            <a:r>
-              <a:rPr b="1" lang="zh-CN" sz="1050">
-                <a:solidFill>
-                  <a:schemeClr val="dk1"/>
-                </a:solidFill>
-              </a:rPr>
-              <a:t>(10618)</a:t>
-            </a:r>
-            <a:r>
-              <a:rPr b="0" i="0" lang="zh-CN" sz="1050" u="none" cap="none" strike="noStrike">
-                <a:solidFill>
-                  <a:schemeClr val="dk1"/>
-                </a:solidFill>
-                <a:latin typeface="Arial"/>
-                <a:ea typeface="Arial"/>
-                <a:cs typeface="Arial"/>
-                <a:sym typeface="Arial"/>
-              </a:rPr>
-              <a:t>: </a:t>
-            </a:r>
-            <a:r>
-              <a:rPr lang="zh-CN" sz="1050">
-                <a:solidFill>
-                  <a:schemeClr val="dk1"/>
-                </a:solidFill>
-              </a:rPr>
-              <a:t>Taking the suspect who caused the disaster into custody</a:t>
+              <a:t>: Taking the suspect who caused the disaster into custody</a:t>
             </a:r>
             <a:endParaRPr b="0" i="0" sz="1050" u="none" cap="none" strike="noStrike">
               <a:solidFill>
@@ -16844,14 +16718,22 @@
                 <a:spcPts val="0"/>
               </a:spcAft>
               <a:buClr>
-                <a:srgbClr val="000000"/>
-              </a:buClr>
-              <a:buSzPts val="1050"/>
+                <a:schemeClr val="dk1"/>
+              </a:buClr>
+              <a:buSzPts val="1100"/>
               <a:buFont typeface="Arial"/>
               <a:buNone/>
             </a:pPr>
             <a:r>
-              <a:rPr b="1" i="0" lang="zh-CN" sz="1050" u="none" cap="none" strike="noStrike">
+              <a:rPr b="1" lang="zh-CN" sz="1050">
+                <a:solidFill>
+                  <a:schemeClr val="dk1"/>
+                </a:solidFill>
+              </a:rPr>
+              <a:t>Handcuffing</a:t>
+            </a:r>
+            <a:r>
+              <a:rPr b="0" i="0" lang="zh-CN" sz="1050" u="none" cap="none" strike="noStrike">
                 <a:solidFill>
                   <a:schemeClr val="dk1"/>
                 </a:solidFill>
@@ -16860,15 +16742,83 @@
                 <a:cs typeface="Arial"/>
                 <a:sym typeface="Arial"/>
               </a:rPr>
-              <a:t>Inspect </a:t>
+              <a:t>: Using handcuffs to secure a suspect who initiated the disaster.</a:t>
+            </a:r>
+            <a:endParaRPr b="0" i="0" sz="1050" u="none" cap="none" strike="noStrike">
+              <a:solidFill>
+                <a:schemeClr val="dk1"/>
+              </a:solidFill>
+              <a:latin typeface="Arial"/>
+              <a:ea typeface="Arial"/>
+              <a:cs typeface="Arial"/>
+              <a:sym typeface="Arial"/>
+            </a:endParaRPr>
+          </a:p>
+          <a:p>
+            <a:pPr indent="0" lvl="0" marL="0" rtl="0" algn="l">
+              <a:lnSpc>
+                <a:spcPct val="115000"/>
+              </a:lnSpc>
+              <a:spcBef>
+                <a:spcPts val="600"/>
+              </a:spcBef>
+              <a:spcAft>
+                <a:spcPts val="0"/>
+              </a:spcAft>
+              <a:buClr>
+                <a:schemeClr val="dk1"/>
+              </a:buClr>
+              <a:buSzPts val="1100"/>
+              <a:buFont typeface="Arial"/>
+              <a:buNone/>
+            </a:pPr>
+            <a:r>
+              <a:rPr b="1" lang="zh-CN" sz="1050">
+                <a:solidFill>
+                  <a:schemeClr val="dk1"/>
+                </a:solidFill>
+              </a:rPr>
+              <a:t>Restrain</a:t>
             </a:r>
             <a:r>
+              <a:rPr lang="zh-CN" sz="1050">
+                <a:solidFill>
+                  <a:schemeClr val="dk1"/>
+                </a:solidFill>
+              </a:rPr>
+              <a:t>: Physical restraint on the suspect</a:t>
+            </a:r>
+            <a:endParaRPr sz="1050">
+              <a:solidFill>
+                <a:schemeClr val="dk1"/>
+              </a:solidFill>
+            </a:endParaRPr>
+          </a:p>
+          <a:p>
+            <a:pPr indent="0" lvl="0" marL="0" marR="0" rtl="0" algn="l">
+              <a:lnSpc>
+                <a:spcPct val="115000"/>
+              </a:lnSpc>
+              <a:spcBef>
+                <a:spcPts val="600"/>
+              </a:spcBef>
+              <a:spcAft>
+                <a:spcPts val="0"/>
+              </a:spcAft>
+              <a:buClr>
+                <a:schemeClr val="dk1"/>
+              </a:buClr>
+              <a:buSzPts val="1100"/>
+              <a:buFont typeface="Arial"/>
+              <a:buNone/>
+            </a:pPr>
+            <a:r>
               <a:rPr b="1" lang="zh-CN" sz="1050">
                 <a:solidFill>
                   <a:schemeClr val="dk1"/>
                 </a:solidFill>
               </a:rPr>
-              <a:t>(10621)</a:t>
+              <a:t>Interrogation</a:t>
             </a:r>
             <a:r>
               <a:rPr b="0" i="0" lang="zh-CN" sz="1050" u="none" cap="none" strike="noStrike">
@@ -16880,15 +16830,7 @@
                 <a:cs typeface="Arial"/>
                 <a:sym typeface="Arial"/>
               </a:rPr>
-              <a:t>: </a:t>
-            </a:r>
-            <a:r>
-              <a:rPr lang="zh-CN" sz="1050">
-                <a:solidFill>
-                  <a:schemeClr val="dk1"/>
-                </a:solidFill>
-              </a:rPr>
-              <a:t>Organized examination or formal evaluation on the initiator of the disaster</a:t>
+              <a:t>: Interviewing with the goal of eliciting useful information related to suspected crime</a:t>
             </a:r>
             <a:endParaRPr b="0" i="0" sz="1050" u="none" cap="none" strike="noStrike">
               <a:solidFill>
@@ -16912,9 +16854,57 @@
                 <a:spcPts val="0"/>
               </a:spcAft>
               <a:buClr>
-                <a:srgbClr val="000000"/>
-              </a:buClr>
-              <a:buSzPts val="1050"/>
+                <a:schemeClr val="dk1"/>
+              </a:buClr>
+              <a:buSzPts val="1100"/>
+              <a:buFont typeface="Arial"/>
+              <a:buNone/>
+            </a:pPr>
+            <a:r>
+              <a:rPr b="1" lang="zh-CN" sz="1050">
+                <a:solidFill>
+                  <a:schemeClr val="dk1"/>
+                </a:solidFill>
+              </a:rPr>
+              <a:t>Inspect</a:t>
+            </a:r>
+            <a:r>
+              <a:rPr b="0" i="0" lang="zh-CN" sz="1050" u="none" cap="none" strike="noStrike">
+                <a:solidFill>
+                  <a:schemeClr val="dk1"/>
+                </a:solidFill>
+                <a:latin typeface="Arial"/>
+                <a:ea typeface="Arial"/>
+                <a:cs typeface="Arial"/>
+                <a:sym typeface="Arial"/>
+              </a:rPr>
+              <a:t>: Organized examination or formal evaluation on the initiator of the disaster.</a:t>
+            </a:r>
+            <a:endParaRPr b="0" i="0" sz="1050" u="none" cap="none" strike="noStrike">
+              <a:solidFill>
+                <a:schemeClr val="dk1"/>
+              </a:solidFill>
+              <a:latin typeface="Arial"/>
+              <a:ea typeface="Arial"/>
+              <a:cs typeface="Arial"/>
+              <a:sym typeface="Arial"/>
+            </a:endParaRPr>
+          </a:p>
+          <a:p>
+            <a:pPr indent="0" lvl="0" marL="0" marR="0" rtl="0" algn="l">
+              <a:lnSpc>
+                <a:spcPct val="115000"/>
+              </a:lnSpc>
+              <a:spcBef>
+                <a:spcPts val="600"/>
+              </a:spcBef>
+              <a:spcAft>
+                <a:spcPts val="0"/>
+              </a:spcAft>
+              <a:buClr>
+                <a:schemeClr val="dk1"/>
+              </a:buClr>
+              <a:buSzPts val="1100"/>
               <a:buFont typeface="Arial"/>
               <a:buNone/>
             </a:pPr>
@@ -16949,238 +16939,45 @@
               <a:buFont typeface="Arial"/>
               <a:buNone/>
             </a:pPr>
-            <a:br>
-              <a:rPr lang="zh-CN" sz="1050">
-                <a:solidFill>
-                  <a:schemeClr val="dk1"/>
-                </a:solidFill>
-              </a:rPr>
-            </a:br>
-            <a:br>
-              <a:rPr lang="zh-CN" sz="1050">
-                <a:solidFill>
-                  <a:schemeClr val="dk1"/>
-                </a:solidFill>
-              </a:rPr>
-            </a:br>
-            <a:endParaRPr b="0" i="0" sz="1050" u="none" cap="none" strike="noStrike">
+            <a:r>
+              <a:t/>
+            </a:r>
+            <a:endParaRPr sz="1050">
               <a:solidFill>
                 <a:schemeClr val="dk1"/>
               </a:solidFill>
-              <a:latin typeface="Arial"/>
-              <a:ea typeface="Arial"/>
-              <a:cs typeface="Arial"/>
-              <a:sym typeface="Arial"/>
-            </a:endParaRPr>
-          </a:p>
-          <a:p>
-            <a:pPr indent="0" lvl="0" marL="0" marR="0" rtl="0" algn="l">
-              <a:lnSpc>
-                <a:spcPct val="115000"/>
-              </a:lnSpc>
-              <a:spcBef>
-                <a:spcPts val="600"/>
-              </a:spcBef>
-              <a:spcAft>
-                <a:spcPts val="0"/>
-              </a:spcAft>
-              <a:buClr>
-                <a:schemeClr val="dk1"/>
-              </a:buClr>
-              <a:buSzPts val="1100"/>
-              <a:buFont typeface="Arial"/>
-              <a:buNone/>
-            </a:pPr>
-            <a:r>
-              <a:t/>
-            </a:r>
-            <a:endParaRPr b="0" i="0" sz="1050" u="none" cap="none" strike="noStrike">
-              <a:solidFill>
-                <a:schemeClr val="dk1"/>
-              </a:solidFill>
-              <a:latin typeface="Arial"/>
-              <a:ea typeface="Arial"/>
-              <a:cs typeface="Arial"/>
-              <a:sym typeface="Arial"/>
-            </a:endParaRPr>
-          </a:p>
-          <a:p>
-            <a:pPr indent="0" lvl="0" marL="0" marR="0" rtl="0" algn="l">
-              <a:lnSpc>
-                <a:spcPct val="115000"/>
-              </a:lnSpc>
-              <a:spcBef>
-                <a:spcPts val="600"/>
-              </a:spcBef>
-              <a:spcAft>
-                <a:spcPts val="0"/>
-              </a:spcAft>
-              <a:buClr>
-                <a:schemeClr val="dk1"/>
-              </a:buClr>
-              <a:buSzPts val="1100"/>
-              <a:buFont typeface="Arial"/>
-              <a:buNone/>
-            </a:pPr>
-            <a:r>
-              <a:rPr b="1" i="0" lang="zh-CN" sz="1050" u="none" cap="none" strike="noStrike">
-                <a:solidFill>
-                  <a:schemeClr val="dk1"/>
-                </a:solidFill>
-                <a:latin typeface="Arial"/>
-                <a:ea typeface="Arial"/>
-                <a:cs typeface="Arial"/>
-                <a:sym typeface="Arial"/>
-              </a:rPr>
-              <a:t>Interrogation </a:t>
-            </a:r>
-            <a:r>
-              <a:rPr b="1" lang="zh-CN" sz="1050">
-                <a:solidFill>
-                  <a:schemeClr val="dk1"/>
-                </a:solidFill>
-              </a:rPr>
-              <a:t>(10622)</a:t>
-            </a:r>
-            <a:r>
-              <a:rPr b="0" i="0" lang="zh-CN" sz="1050" u="none" cap="none" strike="noStrike">
-                <a:solidFill>
-                  <a:schemeClr val="dk1"/>
-                </a:solidFill>
-                <a:latin typeface="Arial"/>
-                <a:ea typeface="Arial"/>
-                <a:cs typeface="Arial"/>
-                <a:sym typeface="Arial"/>
-              </a:rPr>
-              <a:t>: </a:t>
-            </a:r>
-            <a:r>
-              <a:rPr lang="zh-CN" sz="1050">
-                <a:solidFill>
-                  <a:schemeClr val="dk1"/>
-                </a:solidFill>
-              </a:rPr>
-              <a:t>Interviewing with the goal of eliciting useful information related to suspected crime</a:t>
-            </a:r>
-            <a:br>
-              <a:rPr lang="zh-CN" sz="1050">
-                <a:solidFill>
-                  <a:schemeClr val="dk1"/>
-                </a:solidFill>
-              </a:rPr>
-            </a:br>
-            <a:r>
-              <a:rPr b="1" i="0" lang="zh-CN" sz="1050" u="none" cap="none" strike="noStrike">
-                <a:solidFill>
-                  <a:schemeClr val="dk1"/>
-                </a:solidFill>
-                <a:latin typeface="Arial"/>
-                <a:ea typeface="Arial"/>
-                <a:cs typeface="Arial"/>
-                <a:sym typeface="Arial"/>
-              </a:rPr>
-              <a:t>Handcuffing </a:t>
-            </a:r>
-            <a:r>
-              <a:rPr b="1" lang="zh-CN" sz="1050">
-                <a:solidFill>
-                  <a:schemeClr val="dk1"/>
-                </a:solidFill>
-              </a:rPr>
-              <a:t>(10619)</a:t>
-            </a:r>
-            <a:r>
-              <a:rPr b="0" i="0" lang="zh-CN" sz="1050" u="none" cap="none" strike="noStrike">
-                <a:solidFill>
-                  <a:schemeClr val="dk1"/>
-                </a:solidFill>
-                <a:latin typeface="Arial"/>
-                <a:ea typeface="Arial"/>
-                <a:cs typeface="Arial"/>
-                <a:sym typeface="Arial"/>
-              </a:rPr>
-              <a:t>: </a:t>
-            </a:r>
-            <a:r>
-              <a:rPr lang="zh-CN" sz="1050">
-                <a:solidFill>
-                  <a:schemeClr val="dk1"/>
-                </a:solidFill>
-              </a:rPr>
-              <a:t>Using handcuffs to secure a suspect who initiated the disaster</a:t>
-            </a:r>
-            <a:endParaRPr b="0" i="0" sz="1050" u="none" cap="none" strike="noStrike">
-              <a:solidFill>
-                <a:schemeClr val="dk1"/>
-              </a:solidFill>
-              <a:latin typeface="Arial"/>
-              <a:ea typeface="Arial"/>
-              <a:cs typeface="Arial"/>
-              <a:sym typeface="Arial"/>
-            </a:endParaRPr>
-          </a:p>
-          <a:p>
-            <a:pPr indent="0" lvl="0" marL="0" marR="0" rtl="0" algn="l">
-              <a:lnSpc>
-                <a:spcPct val="115000"/>
-              </a:lnSpc>
-              <a:spcBef>
-                <a:spcPts val="600"/>
-              </a:spcBef>
-              <a:spcAft>
-                <a:spcPts val="0"/>
-              </a:spcAft>
-              <a:buClr>
-                <a:srgbClr val="000000"/>
-              </a:buClr>
-              <a:buSzPts val="1050"/>
-              <a:buFont typeface="Arial"/>
-              <a:buNone/>
-            </a:pPr>
-            <a:r>
-              <a:rPr b="1" i="0" lang="zh-CN" sz="1050" u="none" cap="none" strike="noStrike">
-                <a:solidFill>
-                  <a:schemeClr val="dk1"/>
-                </a:solidFill>
-                <a:latin typeface="Arial"/>
-                <a:ea typeface="Arial"/>
-                <a:cs typeface="Arial"/>
-                <a:sym typeface="Arial"/>
-              </a:rPr>
-              <a:t>Restrain </a:t>
-            </a:r>
-            <a:r>
-              <a:rPr b="1" lang="zh-CN" sz="1050">
-                <a:solidFill>
-                  <a:schemeClr val="dk1"/>
-                </a:solidFill>
-              </a:rPr>
-              <a:t>(10620)</a:t>
-            </a:r>
-            <a:r>
-              <a:rPr b="0" i="0" lang="zh-CN" sz="1050" u="none" cap="none" strike="noStrike">
-                <a:solidFill>
-                  <a:schemeClr val="dk1"/>
-                </a:solidFill>
-                <a:latin typeface="Arial"/>
-                <a:ea typeface="Arial"/>
-                <a:cs typeface="Arial"/>
-                <a:sym typeface="Arial"/>
-              </a:rPr>
-              <a:t>: Physical restraint on the suspect</a:t>
-            </a:r>
-            <a:endParaRPr b="0" i="0" sz="1400" u="none" cap="none" strike="noStrike">
-              <a:solidFill>
-                <a:srgbClr val="000000"/>
-              </a:solidFill>
-              <a:latin typeface="Arial"/>
-              <a:ea typeface="Arial"/>
-              <a:cs typeface="Arial"/>
-              <a:sym typeface="Arial"/>
             </a:endParaRPr>
           </a:p>
         </p:txBody>
       </p:sp>
+      <p:pic>
+        <p:nvPicPr>
+          <p:cNvPr id="133" name="Google Shape;133;p30"/>
+          <p:cNvPicPr preferRelativeResize="0"/>
+          <p:nvPr/>
+        </p:nvPicPr>
+        <p:blipFill>
+          <a:blip r:embed="rId3">
+            <a:alphaModFix/>
+          </a:blip>
+          <a:stretch>
+            <a:fillRect/>
+          </a:stretch>
+        </p:blipFill>
+        <p:spPr>
+          <a:xfrm>
+            <a:off x="3641625" y="1587950"/>
+            <a:ext cx="5288549" cy="1967600"/>
+          </a:xfrm>
+          <a:prstGeom prst="rect">
+            <a:avLst/>
+          </a:prstGeom>
+          <a:noFill/>
+          <a:ln>
+            <a:noFill/>
+          </a:ln>
+        </p:spPr>
+      </p:pic>
     </p:spTree>
   </p:cSld>
   <p:clrMapOvr>
@@ -17263,7 +17060,7 @@
         <p:spPr>
           <a:xfrm>
             <a:off x="125" y="471600"/>
-            <a:ext cx="9144000" cy="2897700"/>
+            <a:ext cx="9144000" cy="2711700"/>
           </a:xfrm>
           <a:prstGeom prst="rect">
             <a:avLst/>
@@ -17284,194 +17081,38 @@
                 <a:spcPct val="115000"/>
               </a:lnSpc>
               <a:spcBef>
-                <a:spcPts val="0"/>
-              </a:spcBef>
-              <a:spcAft>
-                <a:spcPts val="0"/>
-              </a:spcAft>
+                <a:spcPts val="600"/>
+              </a:spcBef>
+              <a:spcAft>
+                <a:spcPts val="0"/>
+              </a:spcAft>
+              <a:buClr>
+                <a:schemeClr val="dk1"/>
+              </a:buClr>
+              <a:buSzPts val="1100"/>
+              <a:buFont typeface="Arial"/>
               <a:buNone/>
             </a:pPr>
             <a:r>
-              <a:rPr b="1" i="0" lang="zh-CN" sz="1050" u="none" cap="none" strike="noStrike">
+              <a:rPr b="1" lang="zh-CN" sz="1050">
                 <a:solidFill>
                   <a:schemeClr val="dk1"/>
                 </a:solidFill>
-                <a:latin typeface="Arial"/>
-                <a:ea typeface="Arial"/>
-                <a:cs typeface="Arial"/>
-                <a:sym typeface="Arial"/>
               </a:rPr>
-              <a:t>File Complaint </a:t>
+              <a:t>File Complaint</a:t>
             </a:r>
             <a:r>
-              <a:rPr b="1" lang="zh-CN" sz="1050">
+              <a:rPr lang="zh-CN" sz="1050">
                 <a:solidFill>
                   <a:schemeClr val="dk1"/>
                 </a:solidFill>
-              </a:rPr>
-              <a:t>(10623)</a:t>
-            </a:r>
-            <a:r>
-              <a:rPr b="0" i="0" lang="zh-CN" sz="1050" u="none" cap="none" strike="noStrike">
-                <a:solidFill>
-                  <a:schemeClr val="dk1"/>
-                </a:solidFill>
-                <a:latin typeface="Arial"/>
-                <a:ea typeface="Arial"/>
-                <a:cs typeface="Arial"/>
-                <a:sym typeface="Arial"/>
               </a:rPr>
               <a:t>: Plaintiff files a complaint to initiate a lawsuit</a:t>
             </a:r>
-            <a:endParaRPr/>
-          </a:p>
-          <a:p>
-            <a:pPr indent="0" lvl="0" marL="0" marR="0" rtl="0" algn="l">
-              <a:lnSpc>
-                <a:spcPct val="115000"/>
-              </a:lnSpc>
-              <a:spcBef>
-                <a:spcPts val="600"/>
-              </a:spcBef>
-              <a:spcAft>
-                <a:spcPts val="0"/>
-              </a:spcAft>
-              <a:buNone/>
-            </a:pPr>
-            <a:r>
-              <a:rPr b="1" i="0" lang="zh-CN" sz="1050" u="none" cap="none" strike="noStrike">
-                <a:solidFill>
-                  <a:schemeClr val="dk1"/>
-                </a:solidFill>
-                <a:latin typeface="Arial"/>
-                <a:ea typeface="Arial"/>
-                <a:cs typeface="Arial"/>
-                <a:sym typeface="Arial"/>
-              </a:rPr>
-              <a:t>Answer </a:t>
-            </a:r>
-            <a:r>
-              <a:rPr b="1" lang="zh-CN" sz="1050">
-                <a:solidFill>
-                  <a:schemeClr val="dk1"/>
-                </a:solidFill>
-              </a:rPr>
-              <a:t>(10624)</a:t>
-            </a:r>
-            <a:r>
-              <a:rPr b="0" i="0" lang="zh-CN" sz="1050" u="none" cap="none" strike="noStrike">
-                <a:solidFill>
-                  <a:schemeClr val="dk1"/>
-                </a:solidFill>
-                <a:latin typeface="Arial"/>
-                <a:ea typeface="Arial"/>
-                <a:cs typeface="Arial"/>
-                <a:sym typeface="Arial"/>
-              </a:rPr>
-              <a:t>: In law, a solemn assertion in opposition to someone or something by the defendant</a:t>
-            </a:r>
-            <a:endParaRPr/>
-          </a:p>
-          <a:p>
-            <a:pPr indent="0" lvl="0" marL="0" marR="0" rtl="0" algn="l">
-              <a:lnSpc>
-                <a:spcPct val="115000"/>
-              </a:lnSpc>
-              <a:spcBef>
-                <a:spcPts val="600"/>
-              </a:spcBef>
-              <a:spcAft>
-                <a:spcPts val="0"/>
-              </a:spcAft>
-              <a:buNone/>
-            </a:pPr>
-            <a:r>
-              <a:rPr b="1" i="0" lang="zh-CN" sz="1050" u="none" cap="none" strike="noStrike">
-                <a:solidFill>
-                  <a:schemeClr val="dk1"/>
-                </a:solidFill>
-                <a:latin typeface="Arial"/>
-                <a:ea typeface="Arial"/>
-                <a:cs typeface="Arial"/>
-                <a:sym typeface="Arial"/>
-              </a:rPr>
-              <a:t>Discovery </a:t>
-            </a:r>
-            <a:r>
-              <a:rPr b="1" lang="zh-CN" sz="1050">
-                <a:solidFill>
-                  <a:schemeClr val="dk1"/>
-                </a:solidFill>
-              </a:rPr>
-              <a:t>(10625)</a:t>
-            </a:r>
-            <a:r>
-              <a:rPr b="0" i="0" lang="zh-CN" sz="1050" u="none" cap="none" strike="noStrike">
-                <a:solidFill>
-                  <a:schemeClr val="dk1"/>
-                </a:solidFill>
-                <a:latin typeface="Arial"/>
-                <a:ea typeface="Arial"/>
-                <a:cs typeface="Arial"/>
-                <a:sym typeface="Arial"/>
-              </a:rPr>
-              <a:t>: Pre-trial procedure in common law countries for obtaining evidence</a:t>
-            </a:r>
-            <a:endParaRPr/>
-          </a:p>
-          <a:p>
-            <a:pPr indent="0" lvl="0" marL="0" marR="0" rtl="0" algn="l">
-              <a:lnSpc>
-                <a:spcPct val="115000"/>
-              </a:lnSpc>
-              <a:spcBef>
-                <a:spcPts val="600"/>
-              </a:spcBef>
-              <a:spcAft>
-                <a:spcPts val="0"/>
-              </a:spcAft>
-              <a:buNone/>
-            </a:pPr>
-            <a:r>
-              <a:rPr b="1" i="0" lang="zh-CN" sz="1050" u="none" cap="none" strike="noStrike">
-                <a:solidFill>
-                  <a:schemeClr val="dk1"/>
-                </a:solidFill>
-                <a:latin typeface="Arial"/>
-                <a:ea typeface="Arial"/>
-                <a:cs typeface="Arial"/>
-                <a:sym typeface="Arial"/>
-              </a:rPr>
-              <a:t>Motion </a:t>
-            </a:r>
-            <a:r>
-              <a:rPr b="1" lang="zh-CN" sz="1050">
-                <a:solidFill>
-                  <a:schemeClr val="dk1"/>
-                </a:solidFill>
-              </a:rPr>
-              <a:t>(10626)</a:t>
-            </a:r>
-            <a:r>
-              <a:rPr b="0" i="0" lang="zh-CN" sz="1050" u="none" cap="none" strike="noStrike">
-                <a:solidFill>
-                  <a:schemeClr val="dk1"/>
-                </a:solidFill>
-                <a:latin typeface="Arial"/>
-                <a:ea typeface="Arial"/>
-                <a:cs typeface="Arial"/>
-                <a:sym typeface="Arial"/>
-              </a:rPr>
-              <a:t>: In US law, a procedural device to bring a limited, contested issue before a court for decision</a:t>
-            </a:r>
-            <a:endParaRPr b="0" i="0" sz="1050" u="none" cap="none" strike="noStrike">
+            <a:endParaRPr sz="1050">
               <a:solidFill>
                 <a:schemeClr val="dk1"/>
               </a:solidFill>
-              <a:latin typeface="Arial"/>
-              <a:ea typeface="Arial"/>
-              <a:cs typeface="Arial"/>
-              <a:sym typeface="Arial"/>
             </a:endParaRPr>
           </a:p>
           <a:p>
@@ -17493,38 +17134,226 @@
               <a:buNone/>
             </a:pPr>
             <a:r>
-              <a:rPr b="1" i="0" lang="zh-CN" sz="1050" u="none" cap="none" strike="noStrike">
+              <a:rPr b="1" lang="zh-CN" sz="1050">
                 <a:solidFill>
                   <a:schemeClr val="dk1"/>
                 </a:solidFill>
-                <a:latin typeface="Arial"/>
-                <a:ea typeface="Arial"/>
-                <a:cs typeface="Arial"/>
-                <a:sym typeface="Arial"/>
               </a:rPr>
-              <a:t>Trial </a:t>
+              <a:t>Answer</a:t>
             </a:r>
             <a:r>
+              <a:rPr lang="zh-CN" sz="1050">
+                <a:solidFill>
+                  <a:schemeClr val="dk1"/>
+                </a:solidFill>
+              </a:rPr>
+              <a:t>: In law, a solemn assertion in opposition to someone or something by the defendant</a:t>
+            </a:r>
+            <a:endParaRPr sz="1050">
+              <a:solidFill>
+                <a:schemeClr val="dk1"/>
+              </a:solidFill>
+            </a:endParaRPr>
+          </a:p>
+          <a:p>
+            <a:pPr indent="0" lvl="0" marL="0" marR="0" rtl="0" algn="l">
+              <a:lnSpc>
+                <a:spcPct val="115000"/>
+              </a:lnSpc>
+              <a:spcBef>
+                <a:spcPts val="600"/>
+              </a:spcBef>
+              <a:spcAft>
+                <a:spcPts val="0"/>
+              </a:spcAft>
+              <a:buClr>
+                <a:schemeClr val="dk1"/>
+              </a:buClr>
+              <a:buSzPts val="1100"/>
+              <a:buFont typeface="Arial"/>
+              <a:buNone/>
+            </a:pPr>
+            <a:r>
               <a:rPr b="1" lang="zh-CN" sz="1050">
                 <a:solidFill>
                   <a:schemeClr val="dk1"/>
                 </a:solidFill>
               </a:rPr>
-              <a:t>(10630)</a:t>
+              <a:t>Discovery</a:t>
             </a:r>
             <a:r>
-              <a:rPr b="0" i="0" lang="zh-CN" sz="1050" u="none" cap="none" strike="noStrike">
+              <a:rPr lang="zh-CN" sz="1050">
                 <a:solidFill>
                   <a:schemeClr val="dk1"/>
                 </a:solidFill>
-                <a:latin typeface="Arial"/>
-                <a:ea typeface="Arial"/>
-                <a:cs typeface="Arial"/>
-                <a:sym typeface="Arial"/>
+              </a:rPr>
+              <a:t>: Pre-trial procedure in common law countries for obtaining evidence</a:t>
+            </a:r>
+            <a:endParaRPr sz="1050">
+              <a:solidFill>
+                <a:schemeClr val="dk1"/>
+              </a:solidFill>
+            </a:endParaRPr>
+          </a:p>
+          <a:p>
+            <a:pPr indent="0" lvl="0" marL="0" marR="0" rtl="0" algn="l">
+              <a:lnSpc>
+                <a:spcPct val="115000"/>
+              </a:lnSpc>
+              <a:spcBef>
+                <a:spcPts val="600"/>
+              </a:spcBef>
+              <a:spcAft>
+                <a:spcPts val="0"/>
+              </a:spcAft>
+              <a:buClr>
+                <a:schemeClr val="dk1"/>
+              </a:buClr>
+              <a:buSzPts val="1100"/>
+              <a:buFont typeface="Arial"/>
+              <a:buNone/>
+            </a:pPr>
+            <a:r>
+              <a:rPr b="1" lang="zh-CN" sz="1050">
+                <a:solidFill>
+                  <a:schemeClr val="dk1"/>
+                </a:solidFill>
+              </a:rPr>
+              <a:t>Motion</a:t>
+            </a:r>
+            <a:r>
+              <a:rPr lang="zh-CN" sz="1050">
+                <a:solidFill>
+                  <a:schemeClr val="dk1"/>
+                </a:solidFill>
+              </a:rPr>
+              <a:t>: In US law, a procedural device to bring a limited, contested issue before a court for decision</a:t>
+            </a:r>
+            <a:endParaRPr sz="1050">
+              <a:solidFill>
+                <a:schemeClr val="dk1"/>
+              </a:solidFill>
+            </a:endParaRPr>
+          </a:p>
+          <a:p>
+            <a:pPr indent="0" lvl="0" marL="0" marR="0" rtl="0" algn="l">
+              <a:lnSpc>
+                <a:spcPct val="115000"/>
+              </a:lnSpc>
+              <a:spcBef>
+                <a:spcPts val="600"/>
+              </a:spcBef>
+              <a:spcAft>
+                <a:spcPts val="0"/>
+              </a:spcAft>
+              <a:buClr>
+                <a:schemeClr val="dk1"/>
+              </a:buClr>
+              <a:buSzPts val="1100"/>
+              <a:buFont typeface="Arial"/>
+              <a:buNone/>
+            </a:pPr>
+            <a:r>
+              <a:rPr b="1" lang="zh-CN" sz="1050">
+                <a:solidFill>
+                  <a:schemeClr val="dk1"/>
+                </a:solidFill>
+              </a:rPr>
+              <a:t>Mediation</a:t>
+            </a:r>
+            <a:r>
+              <a:rPr lang="zh-CN" sz="1050">
+                <a:solidFill>
+                  <a:schemeClr val="dk1"/>
+                </a:solidFill>
+              </a:rPr>
+              <a:t>: Dispute resolution with assistance of an impartial third party moderator throughthe use of communication and negotiation techniques</a:t>
+            </a:r>
+            <a:endParaRPr sz="1050">
+              <a:solidFill>
+                <a:schemeClr val="dk1"/>
+              </a:solidFill>
+            </a:endParaRPr>
+          </a:p>
+          <a:p>
+            <a:pPr indent="0" lvl="0" marL="0" marR="0" rtl="0" algn="l">
+              <a:lnSpc>
+                <a:spcPct val="115000"/>
+              </a:lnSpc>
+              <a:spcBef>
+                <a:spcPts val="600"/>
+              </a:spcBef>
+              <a:spcAft>
+                <a:spcPts val="0"/>
+              </a:spcAft>
+              <a:buClr>
+                <a:schemeClr val="dk1"/>
+              </a:buClr>
+              <a:buSzPts val="1100"/>
+              <a:buFont typeface="Arial"/>
+              <a:buNone/>
+            </a:pPr>
+            <a:r>
+              <a:rPr b="1" lang="zh-CN" sz="1050">
+                <a:solidFill>
+                  <a:schemeClr val="dk1"/>
+                </a:solidFill>
+              </a:rPr>
+              <a:t>Settlement</a:t>
+            </a:r>
+            <a:r>
+              <a:rPr lang="zh-CN" sz="1050">
+                <a:solidFill>
+                  <a:schemeClr val="dk1"/>
+                </a:solidFill>
+              </a:rPr>
+              <a:t>: The dispute is resolved through a payment of money.</a:t>
+            </a:r>
+            <a:endParaRPr sz="1050">
+              <a:solidFill>
+                <a:schemeClr val="dk1"/>
+              </a:solidFill>
+            </a:endParaRPr>
+          </a:p>
+          <a:p>
+            <a:pPr indent="0" lvl="0" marL="0" marR="0" rtl="0" algn="l">
+              <a:lnSpc>
+                <a:spcPct val="115000"/>
+              </a:lnSpc>
+              <a:spcBef>
+                <a:spcPts val="600"/>
+              </a:spcBef>
+              <a:spcAft>
+                <a:spcPts val="0"/>
+              </a:spcAft>
+              <a:buClr>
+                <a:schemeClr val="dk1"/>
+              </a:buClr>
+              <a:buSzPts val="1100"/>
+              <a:buFont typeface="Arial"/>
+              <a:buNone/>
+            </a:pPr>
+            <a:r>
+              <a:rPr b="1" lang="zh-CN" sz="1050">
+                <a:solidFill>
+                  <a:schemeClr val="dk1"/>
+                </a:solidFill>
+              </a:rPr>
+              <a:t>Trial</a:t>
+            </a:r>
+            <a:r>
+              <a:rPr lang="zh-CN" sz="1050">
+                <a:solidFill>
+                  <a:schemeClr val="dk1"/>
+                </a:solidFill>
               </a:rPr>
               <a:t>: Coming together of parties to a dispute, to present information in a tribunal</a:t>
             </a:r>
-            <a:endParaRPr/>
+            <a:endParaRPr sz="1050">
+              <a:solidFill>
+                <a:schemeClr val="dk1"/>
+              </a:solidFill>
+            </a:endParaRPr>
           </a:p>
           <a:p>
             <a:pPr indent="0" lvl="0" marL="0" marR="0" rtl="0" algn="l">
@@ -17537,41 +17366,34 @@
               <a:spcAft>
                 <a:spcPts val="0"/>
               </a:spcAft>
+              <a:buClr>
+                <a:schemeClr val="dk1"/>
+              </a:buClr>
+              <a:buSzPts val="1100"/>
+              <a:buFont typeface="Arial"/>
               <a:buNone/>
             </a:pPr>
             <a:r>
-              <a:rPr b="1" i="0" lang="zh-CN" sz="1050" u="none" cap="none" strike="noStrike">
+              <a:rPr b="1" lang="zh-CN" sz="1050">
                 <a:solidFill>
                   <a:schemeClr val="dk1"/>
                 </a:solidFill>
-                <a:latin typeface="Arial"/>
-                <a:ea typeface="Arial"/>
-                <a:cs typeface="Arial"/>
-                <a:sym typeface="Arial"/>
               </a:rPr>
-              <a:t>Judgement </a:t>
+              <a:t>Judgement</a:t>
             </a:r>
             <a:r>
-              <a:rPr b="1" lang="zh-CN" sz="1050">
+              <a:rPr lang="zh-CN" sz="1050">
                 <a:solidFill>
                   <a:schemeClr val="dk1"/>
                 </a:solidFill>
-              </a:rPr>
-              <a:t>(10631)</a:t>
-            </a:r>
-            <a:r>
-              <a:rPr b="0" i="0" lang="zh-CN" sz="1050" u="none" cap="none" strike="noStrike">
-                <a:solidFill>
-                  <a:schemeClr val="dk1"/>
-                </a:solidFill>
-                <a:latin typeface="Arial"/>
-                <a:ea typeface="Arial"/>
-                <a:cs typeface="Arial"/>
-                <a:sym typeface="Arial"/>
               </a:rPr>
               <a:t>: The formal decision made by a court following a lawsuit</a:t>
             </a:r>
-            <a:endParaRPr/>
+            <a:endParaRPr sz="1050">
+              <a:solidFill>
+                <a:schemeClr val="dk1"/>
+              </a:solidFill>
+            </a:endParaRPr>
           </a:p>
           <a:p>
             <a:pPr indent="0" lvl="0" marL="0" marR="0" rtl="0" algn="l">
@@ -17584,135 +17406,30 @@
               <a:spcAft>
                 <a:spcPts val="0"/>
               </a:spcAft>
+              <a:buSzPts val="1100"/>
               <a:buNone/>
             </a:pPr>
             <a:r>
-              <a:rPr b="1" i="0" lang="zh-CN" sz="1050" u="none" cap="none" strike="noStrike">
+              <a:rPr b="1" lang="zh-CN" sz="1050">
                 <a:solidFill>
                   <a:schemeClr val="dk1"/>
                 </a:solidFill>
-                <a:latin typeface="Arial"/>
-                <a:ea typeface="Arial"/>
-                <a:cs typeface="Arial"/>
-                <a:sym typeface="Arial"/>
               </a:rPr>
-              <a:t>Appeal </a:t>
+              <a:t>Appeal</a:t>
             </a:r>
             <a:r>
-              <a:rPr b="1" lang="zh-CN" sz="1050">
+              <a:rPr lang="zh-CN" sz="1050">
                 <a:solidFill>
                   <a:schemeClr val="dk1"/>
                 </a:solidFill>
-              </a:rPr>
-              <a:t>(10632)</a:t>
-            </a:r>
-            <a:r>
-              <a:rPr b="0" i="0" lang="zh-CN" sz="1050" u="none" cap="none" strike="noStrike">
-                <a:solidFill>
-                  <a:schemeClr val="dk1"/>
-                </a:solidFill>
-                <a:latin typeface="Arial"/>
-                <a:ea typeface="Arial"/>
-                <a:cs typeface="Arial"/>
-                <a:sym typeface="Arial"/>
               </a:rPr>
               <a:t>: Resort to a superior court to review the decision of an inferior court or administrative agency</a:t>
             </a:r>
-            <a:endParaRPr/>
-          </a:p>
-          <a:p>
-            <a:pPr indent="0" lvl="0" marL="0" marR="0" rtl="0" algn="l">
-              <a:lnSpc>
-                <a:spcPct val="115000"/>
-              </a:lnSpc>
-              <a:spcBef>
-                <a:spcPts val="600"/>
-              </a:spcBef>
-              <a:spcAft>
-                <a:spcPts val="0"/>
-              </a:spcAft>
-              <a:buNone/>
-            </a:pPr>
-            <a:r>
-              <a:rPr b="1" i="0" lang="zh-CN" sz="1050" u="none" cap="none" strike="noStrike">
-                <a:solidFill>
-                  <a:schemeClr val="dk1"/>
-                </a:solidFill>
-                <a:latin typeface="Arial"/>
-                <a:ea typeface="Arial"/>
-                <a:cs typeface="Arial"/>
-                <a:sym typeface="Arial"/>
-              </a:rPr>
-              <a:t>Mediation </a:t>
-            </a:r>
-            <a:r>
-              <a:rPr b="1" lang="zh-CN" sz="1050">
-                <a:solidFill>
-                  <a:schemeClr val="dk1"/>
-                </a:solidFill>
-              </a:rPr>
-              <a:t>(10628)</a:t>
-            </a:r>
-            <a:r>
-              <a:rPr b="0" i="0" lang="zh-CN" sz="1050" u="none" cap="none" strike="noStrike">
-                <a:solidFill>
-                  <a:schemeClr val="dk1"/>
-                </a:solidFill>
-                <a:latin typeface="Arial"/>
-                <a:ea typeface="Arial"/>
-                <a:cs typeface="Arial"/>
-                <a:sym typeface="Arial"/>
-              </a:rPr>
-              <a:t>: Dispute resolution with assistance of an impartial third party moderator through the use of communication and negotiation techniques</a:t>
-            </a:r>
-            <a:endParaRPr/>
-          </a:p>
-          <a:p>
-            <a:pPr indent="0" lvl="0" marL="0" marR="0" rtl="0" algn="l">
-              <a:lnSpc>
-                <a:spcPct val="115000"/>
-              </a:lnSpc>
-              <a:spcBef>
-                <a:spcPts val="600"/>
-              </a:spcBef>
-              <a:spcAft>
-                <a:spcPts val="0"/>
-              </a:spcAft>
-              <a:buNone/>
-            </a:pPr>
-            <a:r>
-              <a:rPr b="1" i="0" lang="zh-CN" sz="1050" u="none" cap="none" strike="noStrike">
-                <a:solidFill>
-                  <a:schemeClr val="dk1"/>
-                </a:solidFill>
-                <a:latin typeface="Arial"/>
-                <a:ea typeface="Arial"/>
-                <a:cs typeface="Arial"/>
-                <a:sym typeface="Arial"/>
-              </a:rPr>
-              <a:t>Settlement </a:t>
-            </a:r>
-            <a:r>
-              <a:rPr b="1" lang="zh-CN" sz="1050">
-                <a:solidFill>
-                  <a:schemeClr val="dk1"/>
-                </a:solidFill>
-              </a:rPr>
-              <a:t>(10629)</a:t>
-            </a:r>
-            <a:r>
-              <a:rPr b="0" i="0" lang="zh-CN" sz="1050" u="none" cap="none" strike="noStrike">
-                <a:solidFill>
-                  <a:schemeClr val="dk1"/>
-                </a:solidFill>
-                <a:latin typeface="Arial"/>
-                <a:ea typeface="Arial"/>
-                <a:cs typeface="Arial"/>
-                <a:sym typeface="Arial"/>
-              </a:rPr>
-              <a:t>: The dispute is resolved through a payment of money</a:t>
-            </a:r>
-            <a:endParaRPr/>
+            <a:endParaRPr sz="1050">
+              <a:solidFill>
+                <a:schemeClr val="dk1"/>
+              </a:solidFill>
+            </a:endParaRPr>
           </a:p>
           <a:p>
             <a:pPr indent="0" lvl="0" marL="0" marR="0" rtl="0" algn="l">
@@ -17730,14 +17447,10 @@
             <a:r>
               <a:t/>
             </a:r>
-            <a:endParaRPr b="0" i="0" sz="1050" u="none" cap="none" strike="noStrike">
+            <a:endParaRPr sz="1050">
               <a:solidFill>
                 <a:schemeClr val="dk1"/>
               </a:solidFill>
-              <a:latin typeface="Arial"/>
-              <a:ea typeface="Arial"/>
-              <a:cs typeface="Arial"/>
-              <a:sym typeface="Arial"/>
             </a:endParaRPr>
           </a:p>
         </p:txBody>
@@ -17752,13 +17465,13 @@
           <a:blip r:embed="rId3">
             <a:alphaModFix/>
           </a:blip>
-          <a:srcRect b="0" l="0" r="0" t="0"/>
+          <a:srcRect b="20369" l="0" r="0" t="0"/>
           <a:stretch/>
         </p:blipFill>
         <p:spPr>
           <a:xfrm>
-            <a:off x="0" y="3023461"/>
-            <a:ext cx="9143999" cy="1823893"/>
+            <a:off x="335925" y="3320075"/>
+            <a:ext cx="8472149" cy="1571050"/>
           </a:xfrm>
           <a:prstGeom prst="rect">
             <a:avLst/>
@@ -17979,9 +17692,9 @@
 </file>
 
 <file path=ppt/theme/theme1.xml><?xml version="1.0" encoding="utf-8"?>
-<a:theme xmlns:a="http://schemas.openxmlformats.org/drawingml/2006/main" xmlns:r="http://schemas.openxmlformats.org/officeDocument/2006/relationships">
+<a:theme xmlns:a="http://schemas.openxmlformats.org/drawingml/2006/main" xmlns:r="http://schemas.openxmlformats.org/officeDocument/2006/relationships" name="Simple Light">
   <a:themeElements>
-    <a:clrScheme name="Default">
+    <a:clrScheme name="Simple Light">
       <a:dk1>
         <a:srgbClr val="000000"/>
       </a:dk1>
@@ -17989,34 +17702,34 @@
         <a:srgbClr val="FFFFFF"/>
       </a:lt1>
       <a:dk2>
-        <a:srgbClr val="158158"/>
+        <a:srgbClr val="595959"/>
       </a:dk2>
       <a:lt2>
-        <a:srgbClr val="F3F3F3"/>
+        <a:srgbClr val="EEEEEE"/>
       </a:lt2>
       <a:accent1>
-        <a:srgbClr val="058DC7"/>
+        <a:srgbClr val="4285F4"/>
       </a:accent1>
       <a:accent2>
-        <a:srgbClr val="50B432"/>
+        <a:srgbClr val="212121"/>
       </a:accent2>
       <a:accent3>
-        <a:srgbClr val="ED561B"/>
+        <a:srgbClr val="78909C"/>
       </a:accent3>
       <a:accent4>
-        <a:srgbClr val="EDEF00"/>
+        <a:srgbClr val="FFAB40"/>
       </a:accent4>
       <a:accent5>
-        <a:srgbClr val="24CBE5"/>
+        <a:srgbClr val="0097A7"/>
       </a:accent5>
       <a:accent6>
-        <a:srgbClr val="64E572"/>
+        <a:srgbClr val="EEFF41"/>
       </a:accent6>
       <a:hlink>
-        <a:srgbClr val="2200CC"/>
+        <a:srgbClr val="0097A7"/>
       </a:hlink>
       <a:folHlink>
-        <a:srgbClr val="551A8B"/>
+        <a:srgbClr val="0097A7"/>
       </a:folHlink>
     </a:clrScheme>
     <a:fontScheme name="Office">
@@ -18258,9 +17971,9 @@
 </file>
 
 <file path=ppt/theme/theme2.xml><?xml version="1.0" encoding="utf-8"?>
-<a:theme xmlns:a="http://schemas.openxmlformats.org/drawingml/2006/main" xmlns:r="http://schemas.openxmlformats.org/officeDocument/2006/relationships" name="Simple Light">
+<a:theme xmlns:a="http://schemas.openxmlformats.org/drawingml/2006/main" xmlns:r="http://schemas.openxmlformats.org/officeDocument/2006/relationships">
   <a:themeElements>
-    <a:clrScheme name="Simple Light">
+    <a:clrScheme name="Default">
       <a:dk1>
         <a:srgbClr val="000000"/>
       </a:dk1>
@@ -18268,34 +17981,34 @@
         <a:srgbClr val="FFFFFF"/>
       </a:lt1>
       <a:dk2>
-        <a:srgbClr val="595959"/>
+        <a:srgbClr val="158158"/>
       </a:dk2>
       <a:lt2>
-        <a:srgbClr val="EEEEEE"/>
+        <a:srgbClr val="F3F3F3"/>
       </a:lt2>
       <a:accent1>
-        <a:srgbClr val="4285F4"/>
+        <a:srgbClr val="058DC7"/>
       </a:accent1>
       <a:accent2>
-        <a:srgbClr val="212121"/>
+        <a:srgbClr val="50B432"/>
       </a:accent2>
       <a:accent3>
-        <a:srgbClr val="78909C"/>
+        <a:srgbClr val="ED561B"/>
       </a:accent3>
       <a:accent4>
-        <a:srgbClr val="FFAB40"/>
+        <a:srgbClr val="EDEF00"/>
       </a:accent4>
       <a:accent5>
-        <a:srgbClr val="0097A7"/>
+        <a:srgbClr val="24CBE5"/>
       </a:accent5>
       <a:accent6>
-        <a:srgbClr val="EEFF41"/>
+        <a:srgbClr val="64E572"/>
       </a:accent6>
       <a:hlink>
-        <a:srgbClr val="0097A7"/>
+        <a:srgbClr val="2200CC"/>
       </a:hlink>
       <a:folHlink>
-        <a:srgbClr val="0097A7"/>
+        <a:srgbClr val="551A8B"/>
       </a:folHlink>
     </a:clrScheme>
     <a:fontScheme name="Office">

</xml_diff>